<commit_message>
Modificaciones menores. Actualizado enunciado de ejercicio 4
</commit_message>
<xml_diff>
--- a/AI 2021 Tema 6 Diseño de automatismos lógicos GRAFCET.pptx
+++ b/AI 2021 Tema 6 Diseño de automatismos lógicos GRAFCET.pptx
@@ -1319,7 +1319,7 @@
           <a:p>
             <a:fld id="{13A98447-8CFF-4273-8719-345336B531D0}" type="datetimeFigureOut">
               <a:rPr lang="es-ES" smtClean="0"/>
-              <a:t>11/03/2021</a:t>
+              <a:t>16/03/2021</a:t>
             </a:fld>
             <a:endParaRPr lang="es-ES"/>
           </a:p>
@@ -1397,7 +1397,7 @@
           <a:p>
             <a:fld id="{84589E00-9B30-4AC3-89FE-E9FF8141C206}" type="slidenum">
               <a:rPr lang="es-ES" smtClean="0"/>
-              <a:t>‹Nº›</a:t>
+              <a:t>‹#›</a:t>
             </a:fld>
             <a:endParaRPr lang="es-ES"/>
           </a:p>
@@ -1500,7 +1500,7 @@
           <a:p>
             <a:fld id="{993FEA6D-63D5-477F-BD73-E9DA72F7C471}" type="datetimeFigureOut">
               <a:rPr lang="es-ES" smtClean="0"/>
-              <a:t>11/03/2021</a:t>
+              <a:t>16/03/2021</a:t>
             </a:fld>
             <a:endParaRPr lang="es-ES"/>
           </a:p>
@@ -1658,7 +1658,7 @@
           <a:p>
             <a:fld id="{227C0E5E-3215-421A-8BEC-BD8A08BA5720}" type="slidenum">
               <a:rPr lang="es-ES" smtClean="0"/>
-              <a:t>‹Nº›</a:t>
+              <a:t>‹#›</a:t>
             </a:fld>
             <a:endParaRPr lang="es-ES"/>
           </a:p>
@@ -2046,7 +2046,15 @@
             </a:r>
             <a:r>
               <a:rPr lang="es-ES" dirty="0"/>
-              <a:t> siempre debe tener un camino cerrado en (en algún momento, algún camino debe llevar al principio)</a:t>
+              <a:t> siempre debe tener un camino cerrado </a:t>
+            </a:r>
+            <a:r>
+              <a:rPr lang="es-ES" dirty="0" smtClean="0"/>
+              <a:t>en( en </a:t>
+            </a:r>
+            <a:r>
+              <a:rPr lang="es-ES" dirty="0"/>
+              <a:t>algún momento, algún camino debe llevar al principio)</a:t>
             </a:r>
           </a:p>
           <a:p>
@@ -3718,7 +3726,15 @@
           <a:p>
             <a:r>
               <a:rPr lang="es-ES" dirty="0"/>
-              <a:t>Hasta ahora, os habéis centrado en los actuadores (neumáticos, hidráulicos, eléctricos) y sensores (de proximidad, posición, aceleración, nivel, presión, temperatura) presentes en los automatismos en la industria. En este tema, vamos a ver como se diseñan los programas que llevan los dispositivos que controlan estos automatismos, los autómatas o </a:t>
+              <a:t>Hasta ahora, </a:t>
+            </a:r>
+            <a:r>
+              <a:rPr lang="es-ES" dirty="0" smtClean="0"/>
+              <a:t>habéis estado viendo </a:t>
+            </a:r>
+            <a:r>
+              <a:rPr lang="es-ES" dirty="0"/>
+              <a:t>los actuadores (neumáticos, hidráulicos, eléctricos) y sensores (de proximidad, posición, aceleración, nivel, presión, temperatura) presentes en los automatismos en la industria. En este tema, vamos a ver como se diseñan los programas que llevan los dispositivos que controlan estos automatismos, los autómatas o </a:t>
             </a:r>
             <a:r>
               <a:rPr lang="es-ES" dirty="0" err="1"/>
@@ -3830,7 +3846,15 @@
           <a:p>
             <a:r>
               <a:rPr lang="es-ES" dirty="0"/>
-              <a:t>La herramienta que se utiliza para diseñar programas para automatismos se denomina GRAFCET (DIAGRAMA DE CONTROL CON ETAPAS Y TRANSICIONES) (del francés). Básicamente, el GRAFCET es un diagrama que representa gráficamente el comportamiento del automatismo, teniendo en cuenta las entradas, las acciones a realizar y los procesos intermedios que han provocado las acciones.</a:t>
+              <a:t>La herramienta que </a:t>
+            </a:r>
+            <a:r>
+              <a:rPr lang="es-ES" dirty="0" smtClean="0"/>
+              <a:t>vamos a utilizar </a:t>
+            </a:r>
+            <a:r>
+              <a:rPr lang="es-ES" dirty="0"/>
+              <a:t>para diseñar programas para automatismos se denomina GRAFCET (DIAGRAMA DE CONTROL CON ETAPAS Y TRANSICIONES) (del francés). Básicamente, el GRAFCET es un diagrama que representa gráficamente el comportamiento del automatismo, teniendo en cuenta las entradas, las acciones a realizar y los procesos intermedios que han provocado las acciones.</a:t>
             </a:r>
           </a:p>
           <a:p>
@@ -3839,7 +3863,15 @@
           <a:p>
             <a:r>
               <a:rPr lang="es-ES" dirty="0"/>
-              <a:t>Aunque inicialmente no fue pensado como un lenguaje de programación, sino como una forma de representar el comportamiento deseado del automatismo, ahora hay muchos tipos de </a:t>
+              <a:t>Aunque inicialmente no fue pensado como un lenguaje de programación, </a:t>
+            </a:r>
+            <a:r>
+              <a:rPr lang="es-ES" dirty="0" smtClean="0"/>
+              <a:t>sino simplemente </a:t>
+            </a:r>
+            <a:r>
+              <a:rPr lang="es-ES" dirty="0"/>
+              <a:t>como una forma de representar el comportamiento deseado del automatismo, ahora hay muchos tipos de </a:t>
             </a:r>
             <a:r>
               <a:rPr lang="es-ES" dirty="0" err="1"/>
@@ -3856,7 +3888,15 @@
           <a:p>
             <a:r>
               <a:rPr lang="es-ES" dirty="0"/>
-              <a:t>Es decir, durante este tema veremos como diseñar diagramas GRAFCET  para conseguir el comportamiento de un automatismo a partir de ciertas especificaciones de funcionamiento. </a:t>
+              <a:t>Es decir, durante este tema veremos como diseñar diagramas </a:t>
+            </a:r>
+            <a:r>
+              <a:rPr lang="es-ES" dirty="0" smtClean="0"/>
+              <a:t>GRAFCET </a:t>
+            </a:r>
+            <a:r>
+              <a:rPr lang="es-ES" dirty="0"/>
+              <a:t>para conseguir el comportamiento de un automatismo a partir de ciertas especificaciones de funcionamiento. </a:t>
             </a:r>
           </a:p>
         </p:txBody>
@@ -4738,7 +4778,7 @@
           <a:p>
             <a:fld id="{00E4C3B4-35F7-4DE8-8640-2226904D5794}" type="datetime1">
               <a:rPr lang="es-ES" smtClean="0"/>
-              <a:t>11/03/2021</a:t>
+              <a:t>16/03/2021</a:t>
             </a:fld>
             <a:endParaRPr lang="es-ES"/>
           </a:p>
@@ -4783,7 +4823,7 @@
           <a:p>
             <a:fld id="{132FADFE-3B8F-471C-ABF0-DBC7717ECBBC}" type="slidenum">
               <a:rPr lang="es-ES" smtClean="0"/>
-              <a:t>‹Nº›</a:t>
+              <a:t>‹#›</a:t>
             </a:fld>
             <a:endParaRPr lang="es-ES"/>
           </a:p>
@@ -4904,7 +4944,7 @@
           <a:p>
             <a:fld id="{0FF529CD-B7D0-4E44-A8D5-623CB72CCBD2}" type="datetime1">
               <a:rPr lang="es-ES" smtClean="0"/>
-              <a:t>11/03/2021</a:t>
+              <a:t>16/03/2021</a:t>
             </a:fld>
             <a:endParaRPr lang="es-ES"/>
           </a:p>
@@ -4949,7 +4989,7 @@
           <a:p>
             <a:fld id="{132FADFE-3B8F-471C-ABF0-DBC7717ECBBC}" type="slidenum">
               <a:rPr lang="es-ES" smtClean="0"/>
-              <a:t>‹Nº›</a:t>
+              <a:t>‹#›</a:t>
             </a:fld>
             <a:endParaRPr lang="es-ES"/>
           </a:p>
@@ -5080,7 +5120,7 @@
           <a:p>
             <a:fld id="{0906BBF6-2B55-495F-A0EA-FFBA19DAE023}" type="datetime1">
               <a:rPr lang="es-ES" smtClean="0"/>
-              <a:t>11/03/2021</a:t>
+              <a:t>16/03/2021</a:t>
             </a:fld>
             <a:endParaRPr lang="es-ES"/>
           </a:p>
@@ -5125,7 +5165,7 @@
           <a:p>
             <a:fld id="{132FADFE-3B8F-471C-ABF0-DBC7717ECBBC}" type="slidenum">
               <a:rPr lang="es-ES" smtClean="0"/>
-              <a:t>‹Nº›</a:t>
+              <a:t>‹#›</a:t>
             </a:fld>
             <a:endParaRPr lang="es-ES"/>
           </a:p>
@@ -5246,7 +5286,7 @@
           <a:p>
             <a:fld id="{B1BAA605-2CB5-47E7-8826-DF8A9B476180}" type="datetime1">
               <a:rPr lang="es-ES" smtClean="0"/>
-              <a:t>11/03/2021</a:t>
+              <a:t>16/03/2021</a:t>
             </a:fld>
             <a:endParaRPr lang="es-ES"/>
           </a:p>
@@ -5291,7 +5331,7 @@
           <a:p>
             <a:fld id="{132FADFE-3B8F-471C-ABF0-DBC7717ECBBC}" type="slidenum">
               <a:rPr lang="es-ES" smtClean="0"/>
-              <a:t>‹Nº›</a:t>
+              <a:t>‹#›</a:t>
             </a:fld>
             <a:endParaRPr lang="es-ES"/>
           </a:p>
@@ -5489,7 +5529,7 @@
           <a:p>
             <a:fld id="{EFBFA489-C2C7-4879-A6AF-6B8B06770D2F}" type="datetime1">
               <a:rPr lang="es-ES" smtClean="0"/>
-              <a:t>11/03/2021</a:t>
+              <a:t>16/03/2021</a:t>
             </a:fld>
             <a:endParaRPr lang="es-ES"/>
           </a:p>
@@ -5534,7 +5574,7 @@
           <a:p>
             <a:fld id="{132FADFE-3B8F-471C-ABF0-DBC7717ECBBC}" type="slidenum">
               <a:rPr lang="es-ES" smtClean="0"/>
-              <a:t>‹Nº›</a:t>
+              <a:t>‹#›</a:t>
             </a:fld>
             <a:endParaRPr lang="es-ES"/>
           </a:p>
@@ -5772,7 +5812,7 @@
           <a:p>
             <a:fld id="{34E4FCA0-80FB-4524-99D9-0D9F97537987}" type="datetime1">
               <a:rPr lang="es-ES" smtClean="0"/>
-              <a:t>11/03/2021</a:t>
+              <a:t>16/03/2021</a:t>
             </a:fld>
             <a:endParaRPr lang="es-ES"/>
           </a:p>
@@ -5817,7 +5857,7 @@
           <a:p>
             <a:fld id="{132FADFE-3B8F-471C-ABF0-DBC7717ECBBC}" type="slidenum">
               <a:rPr lang="es-ES" smtClean="0"/>
-              <a:t>‹Nº›</a:t>
+              <a:t>‹#›</a:t>
             </a:fld>
             <a:endParaRPr lang="es-ES"/>
           </a:p>
@@ -6189,7 +6229,7 @@
           <a:p>
             <a:fld id="{A9F56BCA-BFDA-47FB-A37E-1B252259D267}" type="datetime1">
               <a:rPr lang="es-ES" smtClean="0"/>
-              <a:t>11/03/2021</a:t>
+              <a:t>16/03/2021</a:t>
             </a:fld>
             <a:endParaRPr lang="es-ES"/>
           </a:p>
@@ -6234,7 +6274,7 @@
           <a:p>
             <a:fld id="{132FADFE-3B8F-471C-ABF0-DBC7717ECBBC}" type="slidenum">
               <a:rPr lang="es-ES" smtClean="0"/>
-              <a:t>‹Nº›</a:t>
+              <a:t>‹#›</a:t>
             </a:fld>
             <a:endParaRPr lang="es-ES"/>
           </a:p>
@@ -6304,7 +6344,7 @@
           <a:p>
             <a:fld id="{4533D2A9-8CA6-4738-B5A2-40F5B0D39A29}" type="datetime1">
               <a:rPr lang="es-ES" smtClean="0"/>
-              <a:t>11/03/2021</a:t>
+              <a:t>16/03/2021</a:t>
             </a:fld>
             <a:endParaRPr lang="es-ES"/>
           </a:p>
@@ -6349,7 +6389,7 @@
           <a:p>
             <a:fld id="{132FADFE-3B8F-471C-ABF0-DBC7717ECBBC}" type="slidenum">
               <a:rPr lang="es-ES" smtClean="0"/>
-              <a:t>‹Nº›</a:t>
+              <a:t>‹#›</a:t>
             </a:fld>
             <a:endParaRPr lang="es-ES"/>
           </a:p>
@@ -6397,7 +6437,7 @@
           <a:p>
             <a:fld id="{E62650F7-271E-4B1A-9F8E-1E6C2ADFC2AA}" type="datetime1">
               <a:rPr lang="es-ES" smtClean="0"/>
-              <a:t>11/03/2021</a:t>
+              <a:t>16/03/2021</a:t>
             </a:fld>
             <a:endParaRPr lang="es-ES"/>
           </a:p>
@@ -6442,7 +6482,7 @@
           <a:p>
             <a:fld id="{132FADFE-3B8F-471C-ABF0-DBC7717ECBBC}" type="slidenum">
               <a:rPr lang="es-ES" smtClean="0"/>
-              <a:t>‹Nº›</a:t>
+              <a:t>‹#›</a:t>
             </a:fld>
             <a:endParaRPr lang="es-ES"/>
           </a:p>
@@ -6670,7 +6710,7 @@
           <a:p>
             <a:fld id="{9509F2F0-B8DF-4029-9262-1A93C5263006}" type="datetime1">
               <a:rPr lang="es-ES" smtClean="0"/>
-              <a:t>11/03/2021</a:t>
+              <a:t>16/03/2021</a:t>
             </a:fld>
             <a:endParaRPr lang="es-ES"/>
           </a:p>
@@ -6715,7 +6755,7 @@
           <a:p>
             <a:fld id="{132FADFE-3B8F-471C-ABF0-DBC7717ECBBC}" type="slidenum">
               <a:rPr lang="es-ES" smtClean="0"/>
-              <a:t>‹Nº›</a:t>
+              <a:t>‹#›</a:t>
             </a:fld>
             <a:endParaRPr lang="es-ES"/>
           </a:p>
@@ -6920,7 +6960,7 @@
           <a:p>
             <a:fld id="{68A9055A-0DED-4A2A-AE4A-CF21D5127DDE}" type="datetime1">
               <a:rPr lang="es-ES" smtClean="0"/>
-              <a:t>11/03/2021</a:t>
+              <a:t>16/03/2021</a:t>
             </a:fld>
             <a:endParaRPr lang="es-ES"/>
           </a:p>
@@ -6965,7 +7005,7 @@
           <a:p>
             <a:fld id="{132FADFE-3B8F-471C-ABF0-DBC7717ECBBC}" type="slidenum">
               <a:rPr lang="es-ES" smtClean="0"/>
-              <a:t>‹Nº›</a:t>
+              <a:t>‹#›</a:t>
             </a:fld>
             <a:endParaRPr lang="es-ES"/>
           </a:p>
@@ -7129,7 +7169,7 @@
           <a:p>
             <a:fld id="{F6F38952-FC03-470F-901E-E6452E319CAB}" type="datetime1">
               <a:rPr lang="es-ES" smtClean="0"/>
-              <a:t>11/03/2021</a:t>
+              <a:t>16/03/2021</a:t>
             </a:fld>
             <a:endParaRPr lang="es-ES"/>
           </a:p>
@@ -7210,7 +7250,7 @@
           <a:p>
             <a:fld id="{132FADFE-3B8F-471C-ABF0-DBC7717ECBBC}" type="slidenum">
               <a:rPr lang="es-ES" smtClean="0"/>
-              <a:t>‹Nº›</a:t>
+              <a:t>‹#›</a:t>
             </a:fld>
             <a:endParaRPr lang="es-ES"/>
           </a:p>
@@ -13639,7 +13679,7 @@
         </p:blipFill>
         <p:spPr>
           <a:xfrm>
-            <a:off x="4111202" y="1699667"/>
+            <a:off x="4111202" y="1728894"/>
             <a:ext cx="4637262" cy="4144120"/>
           </a:xfrm>
           <a:prstGeom prst="rect">
@@ -15891,7 +15931,7 @@
           <p:nvPr/>
         </p:nvPicPr>
         <p:blipFill>
-          <a:blip r:embed="rId3">
+          <a:blip r:embed="rId3" cstate="print">
             <a:extLst>
               <a:ext uri="{28A0092B-C50C-407E-A947-70E740481C1C}">
                 <a14:useLocalDpi xmlns:a14="http://schemas.microsoft.com/office/drawing/2010/main" val="0"/>

</xml_diff>